<commit_message>
Update Global Sugar Intake Analysis.pptx
</commit_message>
<xml_diff>
--- a/Global Sugar Intake Analysis.pptx
+++ b/Global Sugar Intake Analysis.pptx
@@ -1169,8 +1169,136 @@
               <a:rPr lang="en-US" dirty="0">
                 <a:sym typeface="Wingdings" panose="05000000000000000000" pitchFamily="2" charset="2"/>
               </a:rPr>
-              <a:t> Kapil to fill in </a:t>
-            </a:r>
+              <a:t> </a:t>
+            </a:r>
+          </a:p>
+          <a:p>
+            <a:pPr marL="0" marR="0" lvl="0" indent="0" algn="l" defTabSz="914400" rtl="0" eaLnBrk="1" fontAlgn="auto" latinLnBrk="0" hangingPunct="1">
+              <a:lnSpc>
+                <a:spcPct val="100000"/>
+              </a:lnSpc>
+              <a:spcBef>
+                <a:spcPts val="0"/>
+              </a:spcBef>
+              <a:spcAft>
+                <a:spcPts val="0"/>
+              </a:spcAft>
+              <a:buClrTx/>
+              <a:buSzTx/>
+              <a:buFontTx/>
+              <a:buNone/>
+              <a:tabLst/>
+              <a:defRPr/>
+            </a:pPr>
+            <a:endParaRPr lang="en-US" dirty="0">
+              <a:sym typeface="Wingdings" panose="05000000000000000000" pitchFamily="2" charset="2"/>
+            </a:endParaRPr>
+          </a:p>
+          <a:p>
+            <a:pPr marL="0" marR="0" lvl="0" indent="0" algn="l" defTabSz="914400" rtl="0" eaLnBrk="1" fontAlgn="auto" latinLnBrk="0" hangingPunct="1">
+              <a:lnSpc>
+                <a:spcPct val="100000"/>
+              </a:lnSpc>
+              <a:spcBef>
+                <a:spcPts val="0"/>
+              </a:spcBef>
+              <a:spcAft>
+                <a:spcPts val="0"/>
+              </a:spcAft>
+              <a:buClrTx/>
+              <a:buSzTx/>
+              <a:buFontTx/>
+              <a:buNone/>
+              <a:tabLst/>
+              <a:defRPr/>
+            </a:pPr>
+            <a:r>
+              <a:rPr lang="en-CA" sz="1200" b="0" i="0" kern="1200" dirty="0" err="1">
+                <a:solidFill>
+                  <a:schemeClr val="tx1"/>
+                </a:solidFill>
+                <a:effectLst/>
+                <a:latin typeface="+mn-lt"/>
+                <a:ea typeface="+mn-ea"/>
+                <a:cs typeface="+mn-cs"/>
+              </a:rPr>
+              <a:t>FatSecret</a:t>
+            </a:r>
+            <a:r>
+              <a:rPr lang="en-CA" sz="1200" b="0" i="0" kern="1200" dirty="0">
+                <a:solidFill>
+                  <a:schemeClr val="tx1"/>
+                </a:solidFill>
+                <a:effectLst/>
+                <a:latin typeface="+mn-lt"/>
+                <a:ea typeface="+mn-ea"/>
+                <a:cs typeface="+mn-cs"/>
+              </a:rPr>
+              <a:t> Website API</a:t>
+            </a:r>
+            <a:br>
+              <a:rPr lang="en-CA" dirty="0"/>
+            </a:br>
+            <a:r>
+              <a:rPr lang="en-CA" sz="1200" b="0" i="0" kern="1200" dirty="0">
+                <a:solidFill>
+                  <a:schemeClr val="tx1"/>
+                </a:solidFill>
+                <a:effectLst/>
+                <a:latin typeface="+mn-lt"/>
+                <a:ea typeface="+mn-ea"/>
+                <a:cs typeface="+mn-cs"/>
+              </a:rPr>
+              <a:t>-         Issues had to send in two set of keys to retrieve Data</a:t>
+            </a:r>
+            <a:br>
+              <a:rPr lang="en-CA" dirty="0"/>
+            </a:br>
+            <a:r>
+              <a:rPr lang="en-CA" sz="1200" b="0" i="0" kern="1200" dirty="0">
+                <a:solidFill>
+                  <a:schemeClr val="tx1"/>
+                </a:solidFill>
+                <a:effectLst/>
+                <a:latin typeface="+mn-lt"/>
+                <a:ea typeface="+mn-ea"/>
+                <a:cs typeface="+mn-cs"/>
+              </a:rPr>
+              <a:t>-         Data was hard to retrieve as we had to run loops to get sugar content (as it was deeply embedded into products id)</a:t>
+            </a:r>
+            <a:br>
+              <a:rPr lang="en-CA" dirty="0"/>
+            </a:br>
+            <a:r>
+              <a:rPr lang="en-CA" sz="1200" b="0" i="0" kern="1200" dirty="0">
+                <a:solidFill>
+                  <a:schemeClr val="tx1"/>
+                </a:solidFill>
+                <a:effectLst/>
+                <a:latin typeface="+mn-lt"/>
+                <a:ea typeface="+mn-ea"/>
+                <a:cs typeface="+mn-cs"/>
+              </a:rPr>
+              <a:t>-         Data was all set as Object and had to convert to Float.</a:t>
+            </a:r>
+            <a:br>
+              <a:rPr lang="en-CA" dirty="0"/>
+            </a:br>
+            <a:r>
+              <a:rPr lang="en-CA" sz="1200" b="0" i="0" kern="1200">
+                <a:solidFill>
+                  <a:schemeClr val="tx1"/>
+                </a:solidFill>
+                <a:effectLst/>
+                <a:latin typeface="+mn-lt"/>
+                <a:ea typeface="+mn-ea"/>
+                <a:cs typeface="+mn-cs"/>
+              </a:rPr>
+              <a:t>-         Data was skewed and had to clean data as the sugar contents would was not separated by sizes.</a:t>
+            </a:r>
+            <a:endParaRPr lang="en-US" dirty="0">
+              <a:sym typeface="Wingdings" panose="05000000000000000000" pitchFamily="2" charset="2"/>
+            </a:endParaRPr>
           </a:p>
           <a:p>
             <a:pPr marL="0" marR="0" lvl="0" indent="0" algn="l" defTabSz="914400" rtl="0" eaLnBrk="1" fontAlgn="auto" latinLnBrk="0" hangingPunct="1">

</xml_diff>